<commit_message>
Fix typo in powerpoint
</commit_message>
<xml_diff>
--- a/slides/BUS_Z_798_Week_4.pptx
+++ b/slides/BUS_Z_798_Week_4.pptx
@@ -3187,7 +3187,7 @@
           <a:p>
             <a:fld id="{740993C0-9AB3-4209-9AF9-896CEF8BC588}" type="datetimeFigureOut">
               <a:rPr lang="en-US" smtClean="0"/>
-              <a:t>1/30/2024</a:t>
+              <a:t>1/31/2024</a:t>
             </a:fld>
             <a:endParaRPr lang="en-US"/>
           </a:p>
@@ -3357,7 +3357,7 @@
           <a:p>
             <a:fld id="{740993C0-9AB3-4209-9AF9-896CEF8BC588}" type="datetimeFigureOut">
               <a:rPr lang="en-US" smtClean="0"/>
-              <a:t>1/30/2024</a:t>
+              <a:t>1/31/2024</a:t>
             </a:fld>
             <a:endParaRPr lang="en-US"/>
           </a:p>
@@ -3537,7 +3537,7 @@
           <a:p>
             <a:fld id="{740993C0-9AB3-4209-9AF9-896CEF8BC588}" type="datetimeFigureOut">
               <a:rPr lang="en-US" smtClean="0"/>
-              <a:t>1/30/2024</a:t>
+              <a:t>1/31/2024</a:t>
             </a:fld>
             <a:endParaRPr lang="en-US"/>
           </a:p>
@@ -3707,7 +3707,7 @@
           <a:p>
             <a:fld id="{740993C0-9AB3-4209-9AF9-896CEF8BC588}" type="datetimeFigureOut">
               <a:rPr lang="en-US" smtClean="0"/>
-              <a:t>1/30/2024</a:t>
+              <a:t>1/31/2024</a:t>
             </a:fld>
             <a:endParaRPr lang="en-US"/>
           </a:p>
@@ -3953,7 +3953,7 @@
           <a:p>
             <a:fld id="{740993C0-9AB3-4209-9AF9-896CEF8BC588}" type="datetimeFigureOut">
               <a:rPr lang="en-US" smtClean="0"/>
-              <a:t>1/30/2024</a:t>
+              <a:t>1/31/2024</a:t>
             </a:fld>
             <a:endParaRPr lang="en-US"/>
           </a:p>
@@ -4185,7 +4185,7 @@
           <a:p>
             <a:fld id="{740993C0-9AB3-4209-9AF9-896CEF8BC588}" type="datetimeFigureOut">
               <a:rPr lang="en-US" smtClean="0"/>
-              <a:t>1/30/2024</a:t>
+              <a:t>1/31/2024</a:t>
             </a:fld>
             <a:endParaRPr lang="en-US"/>
           </a:p>
@@ -4552,7 +4552,7 @@
           <a:p>
             <a:fld id="{740993C0-9AB3-4209-9AF9-896CEF8BC588}" type="datetimeFigureOut">
               <a:rPr lang="en-US" smtClean="0"/>
-              <a:t>1/30/2024</a:t>
+              <a:t>1/31/2024</a:t>
             </a:fld>
             <a:endParaRPr lang="en-US"/>
           </a:p>
@@ -4670,7 +4670,7 @@
           <a:p>
             <a:fld id="{740993C0-9AB3-4209-9AF9-896CEF8BC588}" type="datetimeFigureOut">
               <a:rPr lang="en-US" smtClean="0"/>
-              <a:t>1/30/2024</a:t>
+              <a:t>1/31/2024</a:t>
             </a:fld>
             <a:endParaRPr lang="en-US"/>
           </a:p>
@@ -4765,7 +4765,7 @@
           <a:p>
             <a:fld id="{740993C0-9AB3-4209-9AF9-896CEF8BC588}" type="datetimeFigureOut">
               <a:rPr lang="en-US" smtClean="0"/>
-              <a:t>1/30/2024</a:t>
+              <a:t>1/31/2024</a:t>
             </a:fld>
             <a:endParaRPr lang="en-US"/>
           </a:p>
@@ -5042,7 +5042,7 @@
           <a:p>
             <a:fld id="{740993C0-9AB3-4209-9AF9-896CEF8BC588}" type="datetimeFigureOut">
               <a:rPr lang="en-US" smtClean="0"/>
-              <a:t>1/30/2024</a:t>
+              <a:t>1/31/2024</a:t>
             </a:fld>
             <a:endParaRPr lang="en-US"/>
           </a:p>
@@ -5299,7 +5299,7 @@
           <a:p>
             <a:fld id="{740993C0-9AB3-4209-9AF9-896CEF8BC588}" type="datetimeFigureOut">
               <a:rPr lang="en-US" smtClean="0"/>
-              <a:t>1/30/2024</a:t>
+              <a:t>1/31/2024</a:t>
             </a:fld>
             <a:endParaRPr lang="en-US"/>
           </a:p>
@@ -5512,7 +5512,7 @@
           <a:p>
             <a:fld id="{740993C0-9AB3-4209-9AF9-896CEF8BC588}" type="datetimeFigureOut">
               <a:rPr lang="en-US" smtClean="0"/>
-              <a:t>1/30/2024</a:t>
+              <a:t>1/31/2024</a:t>
             </a:fld>
             <a:endParaRPr lang="en-US"/>
           </a:p>
@@ -20732,8 +20732,13 @@
           <a:p>
             <a:r>
               <a:rPr lang="en-US" dirty="0"/>
-              <a:t>IRA+IRR: ICC1, ICC2</a:t>
-            </a:r>
+              <a:t>IRA+IRR: ICC1</a:t>
+            </a:r>
+            <a:r>
+              <a:rPr lang="en-US"/>
+              <a:t>, ICCK</a:t>
+            </a:r>
+            <a:endParaRPr lang="en-US" dirty="0"/>
           </a:p>
           <a:p>
             <a:pPr lvl="1"/>
@@ -20746,7 +20751,7 @@
             <a:pPr lvl="1"/>
             <a:r>
               <a:rPr lang="en-US" dirty="0"/>
-              <a:t>ICC2 – reliability of the group mean</a:t>
+              <a:t>ICCK – reliability of the group mean</a:t>
             </a:r>
           </a:p>
         </p:txBody>
@@ -21156,8 +21161,8 @@
           </a:p>
         </p:txBody>
       </p:sp>
-      <mc:AlternateContent xmlns:mc="http://schemas.openxmlformats.org/markup-compatibility/2006">
-        <mc:Choice xmlns:a14="http://schemas.microsoft.com/office/drawing/2010/main" Requires="a14">
+      <mc:AlternateContent xmlns:mc="http://schemas.openxmlformats.org/markup-compatibility/2006" xmlns:a14="http://schemas.microsoft.com/office/drawing/2010/main">
+        <mc:Choice Requires="a14">
           <p:sp>
             <p:nvSpPr>
               <p:cNvPr id="5" name="Object 18">
@@ -21299,7 +21304,7 @@
             </p:txBody>
           </p:sp>
         </mc:Choice>
-        <mc:Fallback>
+        <mc:Fallback xmlns="">
           <p:sp>
             <p:nvSpPr>
               <p:cNvPr id="5" name="Object 18">

</xml_diff>